<commit_message>
Iconos de atributo/Creacion de clase Atributo
</commit_message>
<xml_diff>
--- a/Bases de Datos A (Apuntes).pptx
+++ b/Bases de Datos A (Apuntes).pptx
@@ -121,6 +121,11 @@
       </a:defRPr>
     </a:lvl9pPr>
   </p:defaultTextStyle>
+  <p:extLst>
+    <p:ext uri="{EFAFB233-063F-42B5-8137-9DF3F51BA10A}">
+      <p15:sldGuideLst xmlns:p15="http://schemas.microsoft.com/office/powerpoint/2012/main"/>
+    </p:ext>
+  </p:extLst>
 </p:presentation>
 </file>
 
@@ -273,7 +278,7 @@
           <a:p>
             <a:fld id="{8EB93C40-44B9-4D68-84FC-E8B5EE2F0794}" type="datetimeFigureOut">
               <a:rPr lang="es-MX" smtClean="0"/>
-              <a:t>07/02/2019</a:t>
+              <a:t>11/02/2019</a:t>
             </a:fld>
             <a:endParaRPr lang="es-MX"/>
           </a:p>
@@ -473,7 +478,7 @@
           <a:p>
             <a:fld id="{8EB93C40-44B9-4D68-84FC-E8B5EE2F0794}" type="datetimeFigureOut">
               <a:rPr lang="es-MX" smtClean="0"/>
-              <a:t>07/02/2019</a:t>
+              <a:t>11/02/2019</a:t>
             </a:fld>
             <a:endParaRPr lang="es-MX"/>
           </a:p>
@@ -683,7 +688,7 @@
           <a:p>
             <a:fld id="{8EB93C40-44B9-4D68-84FC-E8B5EE2F0794}" type="datetimeFigureOut">
               <a:rPr lang="es-MX" smtClean="0"/>
-              <a:t>07/02/2019</a:t>
+              <a:t>11/02/2019</a:t>
             </a:fld>
             <a:endParaRPr lang="es-MX"/>
           </a:p>
@@ -850,7 +855,7 @@
           <a:p>
             <a:fld id="{38391B72-5FC7-41A3-B923-B24EE2AE2A07}" type="datetimeFigureOut">
               <a:rPr lang="es-MX" smtClean="0"/>
-              <a:t>07/02/2019</a:t>
+              <a:t>11/02/2019</a:t>
             </a:fld>
             <a:endParaRPr lang="es-MX" dirty="0"/>
           </a:p>
@@ -1271,7 +1276,7 @@
           <a:p>
             <a:fld id="{8EB93C40-44B9-4D68-84FC-E8B5EE2F0794}" type="datetimeFigureOut">
               <a:rPr lang="es-MX" smtClean="0"/>
-              <a:t>07/02/2019</a:t>
+              <a:t>11/02/2019</a:t>
             </a:fld>
             <a:endParaRPr lang="es-MX"/>
           </a:p>
@@ -1571,7 +1576,7 @@
           <a:p>
             <a:fld id="{8EB93C40-44B9-4D68-84FC-E8B5EE2F0794}" type="datetimeFigureOut">
               <a:rPr lang="es-MX" smtClean="0"/>
-              <a:t>07/02/2019</a:t>
+              <a:t>11/02/2019</a:t>
             </a:fld>
             <a:endParaRPr lang="es-MX"/>
           </a:p>
@@ -1847,7 +1852,7 @@
           <a:p>
             <a:fld id="{8EB93C40-44B9-4D68-84FC-E8B5EE2F0794}" type="datetimeFigureOut">
               <a:rPr lang="es-MX" smtClean="0"/>
-              <a:t>07/02/2019</a:t>
+              <a:t>11/02/2019</a:t>
             </a:fld>
             <a:endParaRPr lang="es-MX"/>
           </a:p>
@@ -2115,7 +2120,7 @@
           <a:p>
             <a:fld id="{8EB93C40-44B9-4D68-84FC-E8B5EE2F0794}" type="datetimeFigureOut">
               <a:rPr lang="es-MX" smtClean="0"/>
-              <a:t>07/02/2019</a:t>
+              <a:t>11/02/2019</a:t>
             </a:fld>
             <a:endParaRPr lang="es-MX"/>
           </a:p>
@@ -2530,7 +2535,7 @@
           <a:p>
             <a:fld id="{8EB93C40-44B9-4D68-84FC-E8B5EE2F0794}" type="datetimeFigureOut">
               <a:rPr lang="es-MX" smtClean="0"/>
-              <a:t>07/02/2019</a:t>
+              <a:t>11/02/2019</a:t>
             </a:fld>
             <a:endParaRPr lang="es-MX"/>
           </a:p>
@@ -2672,7 +2677,7 @@
           <a:p>
             <a:fld id="{8EB93C40-44B9-4D68-84FC-E8B5EE2F0794}" type="datetimeFigureOut">
               <a:rPr lang="es-MX" smtClean="0"/>
-              <a:t>07/02/2019</a:t>
+              <a:t>11/02/2019</a:t>
             </a:fld>
             <a:endParaRPr lang="es-MX"/>
           </a:p>
@@ -2785,7 +2790,7 @@
           <a:p>
             <a:fld id="{8EB93C40-44B9-4D68-84FC-E8B5EE2F0794}" type="datetimeFigureOut">
               <a:rPr lang="es-MX" smtClean="0"/>
-              <a:t>07/02/2019</a:t>
+              <a:t>11/02/2019</a:t>
             </a:fld>
             <a:endParaRPr lang="es-MX"/>
           </a:p>
@@ -3098,7 +3103,7 @@
           <a:p>
             <a:fld id="{8EB93C40-44B9-4D68-84FC-E8B5EE2F0794}" type="datetimeFigureOut">
               <a:rPr lang="es-MX" smtClean="0"/>
-              <a:t>07/02/2019</a:t>
+              <a:t>11/02/2019</a:t>
             </a:fld>
             <a:endParaRPr lang="es-MX"/>
           </a:p>
@@ -3387,7 +3392,7 @@
           <a:p>
             <a:fld id="{8EB93C40-44B9-4D68-84FC-E8B5EE2F0794}" type="datetimeFigureOut">
               <a:rPr lang="es-MX" smtClean="0"/>
-              <a:t>07/02/2019</a:t>
+              <a:t>11/02/2019</a:t>
             </a:fld>
             <a:endParaRPr lang="es-MX"/>
           </a:p>
@@ -3630,7 +3635,7 @@
           <a:p>
             <a:fld id="{8EB93C40-44B9-4D68-84FC-E8B5EE2F0794}" type="datetimeFigureOut">
               <a:rPr lang="es-MX" smtClean="0"/>
-              <a:t>07/02/2019</a:t>
+              <a:t>11/02/2019</a:t>
             </a:fld>
             <a:endParaRPr lang="es-MX"/>
           </a:p>
@@ -4252,6 +4257,9 @@
                           <a14:foregroundMark x1="52111" y1="3846" x2="52111" y2="3846"/>
                           <a14:foregroundMark x1="46111" y1="48269" x2="46111" y2="48269"/>
                         </a14:backgroundRemoval>
+                      </a14:imgEffect>
+                      <a14:imgEffect>
+                        <a14:saturation sat="400000"/>
                       </a14:imgEffect>
                     </a14:imgLayer>
                   </a14:imgProps>
@@ -6936,7 +6944,35 @@
           <a:p>
             <a:r>
               <a:rPr lang="es-MX" dirty="0"/>
-              <a:t>Una base de datos es un conjunto de información organizada y estructurada en repositorios de almacenamiento que permiten una posterior manipulación de los datos de un tema afín.</a:t>
+              <a:t>Una base de datos es un </a:t>
+            </a:r>
+            <a:r>
+              <a:rPr lang="es-MX" b="1" dirty="0">
+                <a:solidFill>
+                  <a:srgbClr val="00B050"/>
+                </a:solidFill>
+              </a:rPr>
+              <a:t>conjunto de información organizada y estructurada</a:t>
+            </a:r>
+            <a:r>
+              <a:rPr lang="es-MX" b="1" dirty="0"/>
+              <a:t> </a:t>
+            </a:r>
+            <a:r>
+              <a:rPr lang="es-MX" dirty="0"/>
+              <a:t>en repositorios de almacenamiento que permiten una </a:t>
+            </a:r>
+            <a:r>
+              <a:rPr lang="es-MX" b="1" dirty="0">
+                <a:solidFill>
+                  <a:srgbClr val="00B050"/>
+                </a:solidFill>
+              </a:rPr>
+              <a:t>posterior manipulación de los datos</a:t>
+            </a:r>
+            <a:r>
+              <a:rPr lang="es-MX" dirty="0"/>
+              <a:t> de un tema afín.</a:t>
             </a:r>
           </a:p>
         </p:txBody>
@@ -7349,15 +7385,7 @@
             <a:pPr lvl="2"/>
             <a:r>
               <a:rPr lang="es-MX" dirty="0"/>
-              <a:t>Comité de Planeación y Requerimientos de </a:t>
-            </a:r>
-            <a:r>
-              <a:rPr lang="es-MX" dirty="0" err="1"/>
-              <a:t>Estandares</a:t>
-            </a:r>
-            <a:r>
-              <a:rPr lang="es-MX" dirty="0"/>
-              <a:t> </a:t>
+              <a:t>Comité de Planeación y Requerimientos de Estándares </a:t>
             </a:r>
           </a:p>
         </p:txBody>

</xml_diff>